<commit_message>
added SSL depricating notice
</commit_message>
<xml_diff>
--- a/SSH_SSL_Single_Sign_On_Auth_Token.pptx
+++ b/SSH_SSL_Single_Sign_On_Auth_Token.pptx
@@ -11484,15 +11484,7 @@
             </a:r>
             <a:r>
               <a:rPr lang="en-US" sz="1200" dirty="0"/>
-              <a:t> = Pretty Good Privacy, since 1991, uses both symmetric an </a:t>
-            </a:r>
-            <a:r>
-              <a:rPr lang="en-US" sz="1200" dirty="0" err="1"/>
-              <a:t>assymmetric</a:t>
-            </a:r>
-            <a:r>
-              <a:rPr lang="en-US" sz="1200" dirty="0"/>
-              <a:t> encryption, the de facto standard for email security.</a:t>
+              <a:t> = Pretty Good Privacy, since 1991, uses both symmetric an asymmetric encryption, the de facto standard for email security.</a:t>
             </a:r>
           </a:p>
           <a:p>
@@ -11572,7 +11564,19 @@
             </a:r>
             <a:r>
               <a:rPr lang="en-US" sz="1200" dirty="0"/>
-              <a:t>  = Transport Layer Security, a successor of SSL 3.0, 1999, </a:t>
+              <a:t>  = Transport Layer Security, </a:t>
+            </a:r>
+            <a:r>
+              <a:rPr lang="en-US" sz="1200" b="1" dirty="0">
+                <a:solidFill>
+                  <a:srgbClr val="FF0000"/>
+                </a:solidFill>
+              </a:rPr>
+              <a:t>a successor of SSL 3.0</a:t>
+            </a:r>
+            <a:r>
+              <a:rPr lang="en-US" sz="1200" dirty="0"/>
+              <a:t>, 1999, </a:t>
             </a:r>
             <a:r>
               <a:rPr lang="en-US" sz="1200" dirty="0">
@@ -12260,6 +12264,45 @@
           </a:p>
         </p:txBody>
       </p:sp>
+      <p:sp>
+        <p:nvSpPr>
+          <p:cNvPr id="8" name="TextBox 7">
+            <a:extLst>
+              <a:ext uri="{FF2B5EF4-FFF2-40B4-BE49-F238E27FC236}">
+                <a16:creationId xmlns:a16="http://schemas.microsoft.com/office/drawing/2014/main" id="{91058441-11B2-9E4C-A970-C80E7974A5A2}"/>
+              </a:ext>
+            </a:extLst>
+          </p:cNvPr>
+          <p:cNvSpPr txBox="1"/>
+          <p:nvPr/>
+        </p:nvSpPr>
+        <p:spPr>
+          <a:xfrm>
+            <a:off x="8814816" y="3350074"/>
+            <a:ext cx="2575995" cy="307777"/>
+          </a:xfrm>
+          <a:prstGeom prst="rect">
+            <a:avLst/>
+          </a:prstGeom>
+          <a:noFill/>
+        </p:spPr>
+        <p:txBody>
+          <a:bodyPr wrap="square" rtlCol="0">
+            <a:spAutoFit/>
+          </a:bodyPr>
+          <a:lstStyle/>
+          <a:p>
+            <a:r>
+              <a:rPr lang="en-US" b="1" dirty="0">
+                <a:solidFill>
+                  <a:srgbClr val="FF0000"/>
+                </a:solidFill>
+              </a:rPr>
+              <a:t>SSL was deprecated in 2015</a:t>
+            </a:r>
+          </a:p>
+        </p:txBody>
+      </p:sp>
     </p:spTree>
   </p:cSld>
   <p:clrMapOvr>

</xml_diff>